<commit_message>
update cover, fix typo
</commit_message>
<xml_diff>
--- a/legislation/nspa cover.pptx
+++ b/legislation/nspa cover.pptx
@@ -104,6 +104,11 @@
       </a:defRPr>
     </a:lvl9pPr>
   </p:defaultTextStyle>
+  <p:extLst>
+    <p:ext uri="{EFAFB233-063F-42B5-8137-9DF3F51BA10A}">
+      <p15:sldGuideLst xmlns:p15="http://schemas.microsoft.com/office/powerpoint/2012/main"/>
+    </p:ext>
+  </p:extLst>
 </p:presentation>
 </file>
 
@@ -238,7 +243,7 @@
           <a:p>
             <a:fld id="{BBC82AEF-C790-3246-BBA6-AD29D4E06EE5}" type="datetimeFigureOut">
               <a:rPr lang="en-US" smtClean="0"/>
-              <a:t>1/28/25</a:t>
+              <a:t>1/30/25</a:t>
             </a:fld>
             <a:endParaRPr lang="en-US"/>
           </a:p>
@@ -408,7 +413,7 @@
           <a:p>
             <a:fld id="{BBC82AEF-C790-3246-BBA6-AD29D4E06EE5}" type="datetimeFigureOut">
               <a:rPr lang="en-US" smtClean="0"/>
-              <a:t>1/28/25</a:t>
+              <a:t>1/30/25</a:t>
             </a:fld>
             <a:endParaRPr lang="en-US"/>
           </a:p>
@@ -588,7 +593,7 @@
           <a:p>
             <a:fld id="{BBC82AEF-C790-3246-BBA6-AD29D4E06EE5}" type="datetimeFigureOut">
               <a:rPr lang="en-US" smtClean="0"/>
-              <a:t>1/28/25</a:t>
+              <a:t>1/30/25</a:t>
             </a:fld>
             <a:endParaRPr lang="en-US"/>
           </a:p>
@@ -758,7 +763,7 @@
           <a:p>
             <a:fld id="{BBC82AEF-C790-3246-BBA6-AD29D4E06EE5}" type="datetimeFigureOut">
               <a:rPr lang="en-US" smtClean="0"/>
-              <a:t>1/28/25</a:t>
+              <a:t>1/30/25</a:t>
             </a:fld>
             <a:endParaRPr lang="en-US"/>
           </a:p>
@@ -1004,7 +1009,7 @@
           <a:p>
             <a:fld id="{BBC82AEF-C790-3246-BBA6-AD29D4E06EE5}" type="datetimeFigureOut">
               <a:rPr lang="en-US" smtClean="0"/>
-              <a:t>1/28/25</a:t>
+              <a:t>1/30/25</a:t>
             </a:fld>
             <a:endParaRPr lang="en-US"/>
           </a:p>
@@ -1236,7 +1241,7 @@
           <a:p>
             <a:fld id="{BBC82AEF-C790-3246-BBA6-AD29D4E06EE5}" type="datetimeFigureOut">
               <a:rPr lang="en-US" smtClean="0"/>
-              <a:t>1/28/25</a:t>
+              <a:t>1/30/25</a:t>
             </a:fld>
             <a:endParaRPr lang="en-US"/>
           </a:p>
@@ -1603,7 +1608,7 @@
           <a:p>
             <a:fld id="{BBC82AEF-C790-3246-BBA6-AD29D4E06EE5}" type="datetimeFigureOut">
               <a:rPr lang="en-US" smtClean="0"/>
-              <a:t>1/28/25</a:t>
+              <a:t>1/30/25</a:t>
             </a:fld>
             <a:endParaRPr lang="en-US"/>
           </a:p>
@@ -1721,7 +1726,7 @@
           <a:p>
             <a:fld id="{BBC82AEF-C790-3246-BBA6-AD29D4E06EE5}" type="datetimeFigureOut">
               <a:rPr lang="en-US" smtClean="0"/>
-              <a:t>1/28/25</a:t>
+              <a:t>1/30/25</a:t>
             </a:fld>
             <a:endParaRPr lang="en-US"/>
           </a:p>
@@ -1816,7 +1821,7 @@
           <a:p>
             <a:fld id="{BBC82AEF-C790-3246-BBA6-AD29D4E06EE5}" type="datetimeFigureOut">
               <a:rPr lang="en-US" smtClean="0"/>
-              <a:t>1/28/25</a:t>
+              <a:t>1/30/25</a:t>
             </a:fld>
             <a:endParaRPr lang="en-US"/>
           </a:p>
@@ -2093,7 +2098,7 @@
           <a:p>
             <a:fld id="{BBC82AEF-C790-3246-BBA6-AD29D4E06EE5}" type="datetimeFigureOut">
               <a:rPr lang="en-US" smtClean="0"/>
-              <a:t>1/28/25</a:t>
+              <a:t>1/30/25</a:t>
             </a:fld>
             <a:endParaRPr lang="en-US"/>
           </a:p>
@@ -2350,7 +2355,7 @@
           <a:p>
             <a:fld id="{BBC82AEF-C790-3246-BBA6-AD29D4E06EE5}" type="datetimeFigureOut">
               <a:rPr lang="en-US" smtClean="0"/>
-              <a:t>1/28/25</a:t>
+              <a:t>1/30/25</a:t>
             </a:fld>
             <a:endParaRPr lang="en-US"/>
           </a:p>
@@ -2563,7 +2568,7 @@
           <a:p>
             <a:fld id="{BBC82AEF-C790-3246-BBA6-AD29D4E06EE5}" type="datetimeFigureOut">
               <a:rPr lang="en-US" smtClean="0"/>
-              <a:t>1/28/25</a:t>
+              <a:t>1/30/25</a:t>
             </a:fld>
             <a:endParaRPr lang="en-US"/>
           </a:p>
@@ -2968,12 +2973,301 @@
           <a:chExt cx="0" cy="0"/>
         </a:xfrm>
       </p:grpSpPr>
+      <p:sp>
+        <p:nvSpPr>
+          <p:cNvPr id="10" name="TextBox 9">
+            <a:extLst>
+              <a:ext uri="{FF2B5EF4-FFF2-40B4-BE49-F238E27FC236}">
+                <a16:creationId xmlns:a16="http://schemas.microsoft.com/office/drawing/2014/main" id="{B23E7DA1-45D1-8D3F-A5D5-9BA77B567C4F}"/>
+              </a:ext>
+            </a:extLst>
+          </p:cNvPr>
+          <p:cNvSpPr txBox="1"/>
+          <p:nvPr/>
+        </p:nvSpPr>
+        <p:spPr>
+          <a:xfrm>
+            <a:off x="293385" y="473856"/>
+            <a:ext cx="7185629" cy="1754326"/>
+          </a:xfrm>
+          <a:prstGeom prst="rect">
+            <a:avLst/>
+          </a:prstGeom>
+          <a:noFill/>
+        </p:spPr>
+        <p:txBody>
+          <a:bodyPr wrap="square" rtlCol="0">
+            <a:spAutoFit/>
+          </a:bodyPr>
+          <a:lstStyle/>
+          <a:p>
+            <a:pPr algn="ctr"/>
+            <a:r>
+              <a:rPr lang="en-US" sz="3600" dirty="0">
+                <a:solidFill>
+                  <a:schemeClr val="bg1"/>
+                </a:solidFill>
+              </a:rPr>
+              <a:t>Protecting a valuable New Mexico Resource :               </a:t>
+            </a:r>
+          </a:p>
+          <a:p>
+            <a:pPr algn="ctr"/>
+            <a:r>
+              <a:rPr lang="en-US" sz="3600" dirty="0">
+                <a:solidFill>
+                  <a:schemeClr val="bg1"/>
+                </a:solidFill>
+              </a:rPr>
+              <a:t>  our night skies</a:t>
+            </a:r>
+          </a:p>
+        </p:txBody>
+      </p:sp>
+      <p:sp>
+        <p:nvSpPr>
+          <p:cNvPr id="11" name="TextBox 10">
+            <a:extLst>
+              <a:ext uri="{FF2B5EF4-FFF2-40B4-BE49-F238E27FC236}">
+                <a16:creationId xmlns:a16="http://schemas.microsoft.com/office/drawing/2014/main" id="{7AF292B1-F64E-A657-9D19-8AA010B8C8BE}"/>
+              </a:ext>
+            </a:extLst>
+          </p:cNvPr>
+          <p:cNvSpPr txBox="1"/>
+          <p:nvPr/>
+        </p:nvSpPr>
+        <p:spPr>
+          <a:xfrm>
+            <a:off x="16971" y="2221296"/>
+            <a:ext cx="7755429" cy="507831"/>
+          </a:xfrm>
+          <a:prstGeom prst="rect">
+            <a:avLst/>
+          </a:prstGeom>
+          <a:noFill/>
+        </p:spPr>
+        <p:txBody>
+          <a:bodyPr wrap="square" rtlCol="0">
+            <a:spAutoFit/>
+          </a:bodyPr>
+          <a:lstStyle/>
+          <a:p>
+            <a:r>
+              <a:rPr lang="en-US" sz="2700" dirty="0">
+                <a:solidFill>
+                  <a:schemeClr val="bg1"/>
+                </a:solidFill>
+              </a:rPr>
+              <a:t>SB34 : Updating the 1999 Night Sky Protection Act</a:t>
+            </a:r>
+          </a:p>
+        </p:txBody>
+      </p:sp>
+      <p:sp>
+        <p:nvSpPr>
+          <p:cNvPr id="16" name="TextBox 15">
+            <a:extLst>
+              <a:ext uri="{FF2B5EF4-FFF2-40B4-BE49-F238E27FC236}">
+                <a16:creationId xmlns:a16="http://schemas.microsoft.com/office/drawing/2014/main" id="{ED679D44-2BB0-2D7E-7815-F6A2D5109767}"/>
+              </a:ext>
+            </a:extLst>
+          </p:cNvPr>
+          <p:cNvSpPr txBox="1"/>
+          <p:nvPr/>
+        </p:nvSpPr>
+        <p:spPr>
+          <a:xfrm>
+            <a:off x="4906687" y="3160272"/>
+            <a:ext cx="1076277" cy="369332"/>
+          </a:xfrm>
+          <a:prstGeom prst="rect">
+            <a:avLst/>
+          </a:prstGeom>
+          <a:noFill/>
+        </p:spPr>
+        <p:txBody>
+          <a:bodyPr wrap="square" rtlCol="0">
+            <a:spAutoFit/>
+          </a:bodyPr>
+          <a:lstStyle/>
+          <a:p>
+            <a:r>
+              <a:rPr lang="en-US" dirty="0">
+                <a:solidFill>
+                  <a:schemeClr val="bg1"/>
+                </a:solidFill>
+              </a:rPr>
+              <a:t>2006</a:t>
+            </a:r>
+          </a:p>
+        </p:txBody>
+      </p:sp>
+      <p:sp>
+        <p:nvSpPr>
+          <p:cNvPr id="17" name="TextBox 16">
+            <a:extLst>
+              <a:ext uri="{FF2B5EF4-FFF2-40B4-BE49-F238E27FC236}">
+                <a16:creationId xmlns:a16="http://schemas.microsoft.com/office/drawing/2014/main" id="{153C9F6B-1407-14ED-7AF8-68191AF93E2A}"/>
+              </a:ext>
+            </a:extLst>
+          </p:cNvPr>
+          <p:cNvSpPr txBox="1"/>
+          <p:nvPr/>
+        </p:nvSpPr>
+        <p:spPr>
+          <a:xfrm>
+            <a:off x="7053141" y="3160272"/>
+            <a:ext cx="1308821" cy="369332"/>
+          </a:xfrm>
+          <a:prstGeom prst="rect">
+            <a:avLst/>
+          </a:prstGeom>
+          <a:noFill/>
+        </p:spPr>
+        <p:txBody>
+          <a:bodyPr wrap="square" rtlCol="0">
+            <a:spAutoFit/>
+          </a:bodyPr>
+          <a:lstStyle/>
+          <a:p>
+            <a:r>
+              <a:rPr lang="en-US" dirty="0">
+                <a:solidFill>
+                  <a:schemeClr val="bg1"/>
+                </a:solidFill>
+              </a:rPr>
+              <a:t>2022</a:t>
+            </a:r>
+          </a:p>
+        </p:txBody>
+      </p:sp>
+      <p:sp>
+        <p:nvSpPr>
+          <p:cNvPr id="18" name="TextBox 17">
+            <a:extLst>
+              <a:ext uri="{FF2B5EF4-FFF2-40B4-BE49-F238E27FC236}">
+                <a16:creationId xmlns:a16="http://schemas.microsoft.com/office/drawing/2014/main" id="{9DC4E1F3-DD0A-8749-7334-33E3D471913B}"/>
+              </a:ext>
+            </a:extLst>
+          </p:cNvPr>
+          <p:cNvSpPr txBox="1"/>
+          <p:nvPr/>
+        </p:nvSpPr>
+        <p:spPr>
+          <a:xfrm>
+            <a:off x="358429" y="6953367"/>
+            <a:ext cx="1009832" cy="338554"/>
+          </a:xfrm>
+          <a:prstGeom prst="rect">
+            <a:avLst/>
+          </a:prstGeom>
+          <a:noFill/>
+        </p:spPr>
+        <p:txBody>
+          <a:bodyPr wrap="square" rtlCol="0">
+            <a:spAutoFit/>
+          </a:bodyPr>
+          <a:lstStyle/>
+          <a:p>
+            <a:r>
+              <a:rPr lang="en-US" sz="1600" dirty="0">
+                <a:solidFill>
+                  <a:schemeClr val="bg1"/>
+                </a:solidFill>
+              </a:rPr>
+              <a:t>Typical</a:t>
+            </a:r>
+            <a:r>
+              <a:rPr lang="en-US" sz="1600" dirty="0"/>
+              <a:t>;</a:t>
+            </a:r>
+          </a:p>
+        </p:txBody>
+      </p:sp>
+      <p:sp>
+        <p:nvSpPr>
+          <p:cNvPr id="19" name="TextBox 18">
+            <a:extLst>
+              <a:ext uri="{FF2B5EF4-FFF2-40B4-BE49-F238E27FC236}">
+                <a16:creationId xmlns:a16="http://schemas.microsoft.com/office/drawing/2014/main" id="{518D9381-4E5F-43C6-3FF0-01A3501AB80A}"/>
+              </a:ext>
+            </a:extLst>
+          </p:cNvPr>
+          <p:cNvSpPr txBox="1"/>
+          <p:nvPr/>
+        </p:nvSpPr>
+        <p:spPr>
+          <a:xfrm>
+            <a:off x="1507787" y="6836948"/>
+            <a:ext cx="2585726" cy="338554"/>
+          </a:xfrm>
+          <a:prstGeom prst="rect">
+            <a:avLst/>
+          </a:prstGeom>
+          <a:noFill/>
+        </p:spPr>
+        <p:txBody>
+          <a:bodyPr wrap="square" rtlCol="0">
+            <a:spAutoFit/>
+          </a:bodyPr>
+          <a:lstStyle/>
+          <a:p>
+            <a:r>
+              <a:rPr lang="en-US" sz="1600" dirty="0">
+                <a:solidFill>
+                  <a:schemeClr val="bg1"/>
+                </a:solidFill>
+              </a:rPr>
+              <a:t>Dark sky compliant!</a:t>
+            </a:r>
+          </a:p>
+        </p:txBody>
+      </p:sp>
+      <p:sp>
+        <p:nvSpPr>
+          <p:cNvPr id="20" name="TextBox 19">
+            <a:extLst>
+              <a:ext uri="{FF2B5EF4-FFF2-40B4-BE49-F238E27FC236}">
+                <a16:creationId xmlns:a16="http://schemas.microsoft.com/office/drawing/2014/main" id="{06F30CED-540C-4A00-F338-ADD296FB4343}"/>
+              </a:ext>
+            </a:extLst>
+          </p:cNvPr>
+          <p:cNvSpPr txBox="1"/>
+          <p:nvPr/>
+        </p:nvSpPr>
+        <p:spPr>
+          <a:xfrm>
+            <a:off x="849755" y="7630085"/>
+            <a:ext cx="2372150" cy="338554"/>
+          </a:xfrm>
+          <a:prstGeom prst="rect">
+            <a:avLst/>
+          </a:prstGeom>
+          <a:noFill/>
+        </p:spPr>
+        <p:txBody>
+          <a:bodyPr wrap="square" rtlCol="0">
+            <a:spAutoFit/>
+          </a:bodyPr>
+          <a:lstStyle/>
+          <a:p>
+            <a:r>
+              <a:rPr lang="en-US" sz="1600" dirty="0">
+                <a:solidFill>
+                  <a:schemeClr val="bg1"/>
+                </a:solidFill>
+              </a:rPr>
+              <a:t>Oil and gas facilities</a:t>
+            </a:r>
+          </a:p>
+        </p:txBody>
+      </p:sp>
       <p:pic>
         <p:nvPicPr>
-          <p:cNvPr id="9" name="Picture 8" descr="A night sky with stars and trees&#10;&#10;AI-generated content may be incorrect.">
+          <p:cNvPr id="3" name="Picture 2" descr="A screenshot of a cell phone&#10;&#10;AI-generated content may be incorrect.">
             <a:extLst>
               <a:ext uri="{FF2B5EF4-FFF2-40B4-BE49-F238E27FC236}">
-                <a16:creationId xmlns:a16="http://schemas.microsoft.com/office/drawing/2014/main" id="{E3A1FA50-B4C4-C3E1-09B8-9BE97EFB7903}"/>
+                <a16:creationId xmlns:a16="http://schemas.microsoft.com/office/drawing/2014/main" id="{211BDEE8-00F9-ED77-0F84-6245B6EAE304}"/>
               </a:ext>
             </a:extLst>
           </p:cNvPr>
@@ -2990,532 +3284,14 @@
         </p:blipFill>
         <p:spPr>
           <a:xfrm>
-            <a:off x="16971" y="-918872"/>
-            <a:ext cx="8167429" cy="11568598"/>
+            <a:off x="0" y="0"/>
+            <a:ext cx="7772400" cy="10058400"/>
           </a:xfrm>
           <a:prstGeom prst="rect">
             <a:avLst/>
           </a:prstGeom>
         </p:spPr>
       </p:pic>
-      <p:sp>
-        <p:nvSpPr>
-          <p:cNvPr id="10" name="TextBox 9">
-            <a:extLst>
-              <a:ext uri="{FF2B5EF4-FFF2-40B4-BE49-F238E27FC236}">
-                <a16:creationId xmlns:a16="http://schemas.microsoft.com/office/drawing/2014/main" id="{B23E7DA1-45D1-8D3F-A5D5-9BA77B567C4F}"/>
-              </a:ext>
-            </a:extLst>
-          </p:cNvPr>
-          <p:cNvSpPr txBox="1"/>
-          <p:nvPr/>
-        </p:nvSpPr>
-        <p:spPr>
-          <a:xfrm>
-            <a:off x="293385" y="473856"/>
-            <a:ext cx="7185629" cy="1754326"/>
-          </a:xfrm>
-          <a:prstGeom prst="rect">
-            <a:avLst/>
-          </a:prstGeom>
-          <a:noFill/>
-        </p:spPr>
-        <p:txBody>
-          <a:bodyPr wrap="square" rtlCol="0">
-            <a:spAutoFit/>
-          </a:bodyPr>
-          <a:lstStyle/>
-          <a:p>
-            <a:pPr algn="ctr"/>
-            <a:r>
-              <a:rPr lang="en-US" sz="3600" dirty="0">
-                <a:solidFill>
-                  <a:schemeClr val="bg1"/>
-                </a:solidFill>
-              </a:rPr>
-              <a:t>Protecting a valuable New Mexico Resource :               </a:t>
-            </a:r>
-          </a:p>
-          <a:p>
-            <a:pPr algn="ctr"/>
-            <a:r>
-              <a:rPr lang="en-US" sz="3600" dirty="0">
-                <a:solidFill>
-                  <a:schemeClr val="bg1"/>
-                </a:solidFill>
-              </a:rPr>
-              <a:t>  our night skies</a:t>
-            </a:r>
-          </a:p>
-        </p:txBody>
-      </p:sp>
-      <p:sp>
-        <p:nvSpPr>
-          <p:cNvPr id="11" name="TextBox 10">
-            <a:extLst>
-              <a:ext uri="{FF2B5EF4-FFF2-40B4-BE49-F238E27FC236}">
-                <a16:creationId xmlns:a16="http://schemas.microsoft.com/office/drawing/2014/main" id="{7AF292B1-F64E-A657-9D19-8AA010B8C8BE}"/>
-              </a:ext>
-            </a:extLst>
-          </p:cNvPr>
-          <p:cNvSpPr txBox="1"/>
-          <p:nvPr/>
-        </p:nvSpPr>
-        <p:spPr>
-          <a:xfrm>
-            <a:off x="16971" y="2221296"/>
-            <a:ext cx="7755429" cy="507831"/>
-          </a:xfrm>
-          <a:prstGeom prst="rect">
-            <a:avLst/>
-          </a:prstGeom>
-          <a:noFill/>
-        </p:spPr>
-        <p:txBody>
-          <a:bodyPr wrap="square" rtlCol="0">
-            <a:spAutoFit/>
-          </a:bodyPr>
-          <a:lstStyle/>
-          <a:p>
-            <a:r>
-              <a:rPr lang="en-US" sz="2700" dirty="0">
-                <a:solidFill>
-                  <a:schemeClr val="bg1"/>
-                </a:solidFill>
-              </a:rPr>
-              <a:t>SB34 : Updating the 1999 Night Sky Protection Act</a:t>
-            </a:r>
-          </a:p>
-        </p:txBody>
-      </p:sp>
-      <p:pic>
-        <p:nvPicPr>
-          <p:cNvPr id="1032" name="Picture 8">
-            <a:extLst>
-              <a:ext uri="{FF2B5EF4-FFF2-40B4-BE49-F238E27FC236}">
-                <a16:creationId xmlns:a16="http://schemas.microsoft.com/office/drawing/2014/main" id="{6E69BC6E-185D-F939-48D2-13FF3E3E1BE9}"/>
-              </a:ext>
-            </a:extLst>
-          </p:cNvPr>
-          <p:cNvPicPr>
-            <a:picLocks noChangeAspect="1" noChangeArrowheads="1"/>
-          </p:cNvPicPr>
-          <p:nvPr/>
-        </p:nvPicPr>
-        <p:blipFill>
-          <a:blip r:embed="rId3">
-            <a:extLst>
-              <a:ext uri="{28A0092B-C50C-407E-A947-70E740481C1C}">
-                <a14:useLocalDpi xmlns:a14="http://schemas.microsoft.com/office/drawing/2010/main" val="0"/>
-              </a:ext>
-            </a:extLst>
-          </a:blip>
-          <a:srcRect/>
-          <a:stretch>
-            <a:fillRect/>
-          </a:stretch>
-        </p:blipFill>
-        <p:spPr bwMode="auto">
-          <a:xfrm>
-            <a:off x="4406457" y="7350097"/>
-            <a:ext cx="3549612" cy="2459766"/>
-          </a:xfrm>
-          <a:prstGeom prst="rect">
-            <a:avLst/>
-          </a:prstGeom>
-          <a:noFill/>
-          <a:extLst>
-            <a:ext uri="{909E8E84-426E-40DD-AFC4-6F175D3DCCD1}">
-              <a14:hiddenFill xmlns:a14="http://schemas.microsoft.com/office/drawing/2010/main">
-                <a:solidFill>
-                  <a:srgbClr val="FFFFFF"/>
-                </a:solidFill>
-              </a14:hiddenFill>
-            </a:ext>
-          </a:extLst>
-        </p:spPr>
-      </p:pic>
-      <p:pic>
-        <p:nvPicPr>
-          <p:cNvPr id="1034" name="Picture 10">
-            <a:extLst>
-              <a:ext uri="{FF2B5EF4-FFF2-40B4-BE49-F238E27FC236}">
-                <a16:creationId xmlns:a16="http://schemas.microsoft.com/office/drawing/2014/main" id="{7CED8E82-CFF2-6BBE-05A4-8494C8EB3A0F}"/>
-              </a:ext>
-            </a:extLst>
-          </p:cNvPr>
-          <p:cNvPicPr>
-            <a:picLocks noChangeAspect="1" noChangeArrowheads="1"/>
-          </p:cNvPicPr>
-          <p:nvPr/>
-        </p:nvPicPr>
-        <p:blipFill>
-          <a:blip r:embed="rId4">
-            <a:extLst>
-              <a:ext uri="{28A0092B-C50C-407E-A947-70E740481C1C}">
-                <a14:useLocalDpi xmlns:a14="http://schemas.microsoft.com/office/drawing/2010/main" val="0"/>
-              </a:ext>
-            </a:extLst>
-          </a:blip>
-          <a:srcRect/>
-          <a:stretch>
-            <a:fillRect/>
-          </a:stretch>
-        </p:blipFill>
-        <p:spPr bwMode="auto">
-          <a:xfrm>
-            <a:off x="218902" y="5471612"/>
-            <a:ext cx="3512567" cy="2634425"/>
-          </a:xfrm>
-          <a:prstGeom prst="rect">
-            <a:avLst/>
-          </a:prstGeom>
-          <a:noFill/>
-          <a:extLst>
-            <a:ext uri="{909E8E84-426E-40DD-AFC4-6F175D3DCCD1}">
-              <a14:hiddenFill xmlns:a14="http://schemas.microsoft.com/office/drawing/2010/main">
-                <a:solidFill>
-                  <a:srgbClr val="FFFFFF"/>
-                </a:solidFill>
-              </a14:hiddenFill>
-            </a:ext>
-          </a:extLst>
-        </p:spPr>
-      </p:pic>
-      <p:pic>
-        <p:nvPicPr>
-          <p:cNvPr id="14" name="Content Placeholder 4" descr="A map of different colors&#10;&#10;Description automatically generated">
-            <a:extLst>
-              <a:ext uri="{FF2B5EF4-FFF2-40B4-BE49-F238E27FC236}">
-                <a16:creationId xmlns:a16="http://schemas.microsoft.com/office/drawing/2014/main" id="{C5774598-4A39-2E90-CE7F-551D34D42C73}"/>
-              </a:ext>
-            </a:extLst>
-          </p:cNvPr>
-          <p:cNvPicPr>
-            <a:picLocks noChangeAspect="1"/>
-          </p:cNvPicPr>
-          <p:nvPr/>
-        </p:nvPicPr>
-        <p:blipFill>
-          <a:blip r:embed="rId5"/>
-          <a:stretch>
-            <a:fillRect/>
-          </a:stretch>
-        </p:blipFill>
-        <p:spPr>
-          <a:xfrm>
-            <a:off x="3516132" y="3124674"/>
-            <a:ext cx="1997564" cy="1980302"/>
-          </a:xfrm>
-          <a:prstGeom prst="rect">
-            <a:avLst/>
-          </a:prstGeom>
-        </p:spPr>
-      </p:pic>
-      <p:pic>
-        <p:nvPicPr>
-          <p:cNvPr id="15" name="Picture 14" descr="A map of different colors&#10;&#10;Description automatically generated">
-            <a:extLst>
-              <a:ext uri="{FF2B5EF4-FFF2-40B4-BE49-F238E27FC236}">
-                <a16:creationId xmlns:a16="http://schemas.microsoft.com/office/drawing/2014/main" id="{C95A3571-8868-AD60-DB1A-26EA20D4E6DD}"/>
-              </a:ext>
-            </a:extLst>
-          </p:cNvPr>
-          <p:cNvPicPr>
-            <a:picLocks noChangeAspect="1"/>
-          </p:cNvPicPr>
-          <p:nvPr/>
-        </p:nvPicPr>
-        <p:blipFill>
-          <a:blip r:embed="rId6"/>
-          <a:stretch>
-            <a:fillRect/>
-          </a:stretch>
-        </p:blipFill>
-        <p:spPr>
-          <a:xfrm>
-            <a:off x="5585738" y="3124674"/>
-            <a:ext cx="2119982" cy="1999928"/>
-          </a:xfrm>
-          <a:prstGeom prst="rect">
-            <a:avLst/>
-          </a:prstGeom>
-        </p:spPr>
-      </p:pic>
-      <p:sp>
-        <p:nvSpPr>
-          <p:cNvPr id="16" name="TextBox 15">
-            <a:extLst>
-              <a:ext uri="{FF2B5EF4-FFF2-40B4-BE49-F238E27FC236}">
-                <a16:creationId xmlns:a16="http://schemas.microsoft.com/office/drawing/2014/main" id="{ED679D44-2BB0-2D7E-7815-F6A2D5109767}"/>
-              </a:ext>
-            </a:extLst>
-          </p:cNvPr>
-          <p:cNvSpPr txBox="1"/>
-          <p:nvPr/>
-        </p:nvSpPr>
-        <p:spPr>
-          <a:xfrm>
-            <a:off x="4906687" y="3160272"/>
-            <a:ext cx="1076277" cy="369332"/>
-          </a:xfrm>
-          <a:prstGeom prst="rect">
-            <a:avLst/>
-          </a:prstGeom>
-          <a:noFill/>
-        </p:spPr>
-        <p:txBody>
-          <a:bodyPr wrap="square" rtlCol="0">
-            <a:spAutoFit/>
-          </a:bodyPr>
-          <a:lstStyle/>
-          <a:p>
-            <a:r>
-              <a:rPr lang="en-US" dirty="0">
-                <a:solidFill>
-                  <a:schemeClr val="bg1"/>
-                </a:solidFill>
-              </a:rPr>
-              <a:t>2006</a:t>
-            </a:r>
-          </a:p>
-        </p:txBody>
-      </p:sp>
-      <p:sp>
-        <p:nvSpPr>
-          <p:cNvPr id="17" name="TextBox 16">
-            <a:extLst>
-              <a:ext uri="{FF2B5EF4-FFF2-40B4-BE49-F238E27FC236}">
-                <a16:creationId xmlns:a16="http://schemas.microsoft.com/office/drawing/2014/main" id="{153C9F6B-1407-14ED-7AF8-68191AF93E2A}"/>
-              </a:ext>
-            </a:extLst>
-          </p:cNvPr>
-          <p:cNvSpPr txBox="1"/>
-          <p:nvPr/>
-        </p:nvSpPr>
-        <p:spPr>
-          <a:xfrm>
-            <a:off x="7053141" y="3160272"/>
-            <a:ext cx="1308821" cy="369332"/>
-          </a:xfrm>
-          <a:prstGeom prst="rect">
-            <a:avLst/>
-          </a:prstGeom>
-          <a:noFill/>
-        </p:spPr>
-        <p:txBody>
-          <a:bodyPr wrap="square" rtlCol="0">
-            <a:spAutoFit/>
-          </a:bodyPr>
-          <a:lstStyle/>
-          <a:p>
-            <a:r>
-              <a:rPr lang="en-US" dirty="0">
-                <a:solidFill>
-                  <a:schemeClr val="bg1"/>
-                </a:solidFill>
-              </a:rPr>
-              <a:t>2022</a:t>
-            </a:r>
-          </a:p>
-        </p:txBody>
-      </p:sp>
-      <p:sp>
-        <p:nvSpPr>
-          <p:cNvPr id="18" name="TextBox 17">
-            <a:extLst>
-              <a:ext uri="{FF2B5EF4-FFF2-40B4-BE49-F238E27FC236}">
-                <a16:creationId xmlns:a16="http://schemas.microsoft.com/office/drawing/2014/main" id="{9DC4E1F3-DD0A-8749-7334-33E3D471913B}"/>
-              </a:ext>
-            </a:extLst>
-          </p:cNvPr>
-          <p:cNvSpPr txBox="1"/>
-          <p:nvPr/>
-        </p:nvSpPr>
-        <p:spPr>
-          <a:xfrm>
-            <a:off x="358429" y="6953367"/>
-            <a:ext cx="1009832" cy="338554"/>
-          </a:xfrm>
-          <a:prstGeom prst="rect">
-            <a:avLst/>
-          </a:prstGeom>
-          <a:noFill/>
-        </p:spPr>
-        <p:txBody>
-          <a:bodyPr wrap="square" rtlCol="0">
-            <a:spAutoFit/>
-          </a:bodyPr>
-          <a:lstStyle/>
-          <a:p>
-            <a:r>
-              <a:rPr lang="en-US" sz="1600" dirty="0">
-                <a:solidFill>
-                  <a:schemeClr val="bg1"/>
-                </a:solidFill>
-              </a:rPr>
-              <a:t>Typical</a:t>
-            </a:r>
-            <a:r>
-              <a:rPr lang="en-US" sz="1600" dirty="0"/>
-              <a:t>;</a:t>
-            </a:r>
-          </a:p>
-        </p:txBody>
-      </p:sp>
-      <p:sp>
-        <p:nvSpPr>
-          <p:cNvPr id="19" name="TextBox 18">
-            <a:extLst>
-              <a:ext uri="{FF2B5EF4-FFF2-40B4-BE49-F238E27FC236}">
-                <a16:creationId xmlns:a16="http://schemas.microsoft.com/office/drawing/2014/main" id="{518D9381-4E5F-43C6-3FF0-01A3501AB80A}"/>
-              </a:ext>
-            </a:extLst>
-          </p:cNvPr>
-          <p:cNvSpPr txBox="1"/>
-          <p:nvPr/>
-        </p:nvSpPr>
-        <p:spPr>
-          <a:xfrm>
-            <a:off x="1507787" y="6836948"/>
-            <a:ext cx="2585726" cy="338554"/>
-          </a:xfrm>
-          <a:prstGeom prst="rect">
-            <a:avLst/>
-          </a:prstGeom>
-          <a:noFill/>
-        </p:spPr>
-        <p:txBody>
-          <a:bodyPr wrap="square" rtlCol="0">
-            <a:spAutoFit/>
-          </a:bodyPr>
-          <a:lstStyle/>
-          <a:p>
-            <a:r>
-              <a:rPr lang="en-US" sz="1600" dirty="0">
-                <a:solidFill>
-                  <a:schemeClr val="bg1"/>
-                </a:solidFill>
-              </a:rPr>
-              <a:t>Dark sky compliant!</a:t>
-            </a:r>
-          </a:p>
-        </p:txBody>
-      </p:sp>
-      <p:sp>
-        <p:nvSpPr>
-          <p:cNvPr id="20" name="TextBox 19">
-            <a:extLst>
-              <a:ext uri="{FF2B5EF4-FFF2-40B4-BE49-F238E27FC236}">
-                <a16:creationId xmlns:a16="http://schemas.microsoft.com/office/drawing/2014/main" id="{06F30CED-540C-4A00-F338-ADD296FB4343}"/>
-              </a:ext>
-            </a:extLst>
-          </p:cNvPr>
-          <p:cNvSpPr txBox="1"/>
-          <p:nvPr/>
-        </p:nvSpPr>
-        <p:spPr>
-          <a:xfrm>
-            <a:off x="849755" y="7630085"/>
-            <a:ext cx="2372150" cy="338554"/>
-          </a:xfrm>
-          <a:prstGeom prst="rect">
-            <a:avLst/>
-          </a:prstGeom>
-          <a:noFill/>
-        </p:spPr>
-        <p:txBody>
-          <a:bodyPr wrap="square" rtlCol="0">
-            <a:spAutoFit/>
-          </a:bodyPr>
-          <a:lstStyle/>
-          <a:p>
-            <a:r>
-              <a:rPr lang="en-US" sz="1600" dirty="0">
-                <a:solidFill>
-                  <a:schemeClr val="bg1"/>
-                </a:solidFill>
-              </a:rPr>
-              <a:t>Oil and gas facilities</a:t>
-            </a:r>
-          </a:p>
-        </p:txBody>
-      </p:sp>
-      <p:sp>
-        <p:nvSpPr>
-          <p:cNvPr id="21" name="TextBox 20">
-            <a:extLst>
-              <a:ext uri="{FF2B5EF4-FFF2-40B4-BE49-F238E27FC236}">
-                <a16:creationId xmlns:a16="http://schemas.microsoft.com/office/drawing/2014/main" id="{9E31088F-B1A1-5EC5-916A-7BFE7036E7CD}"/>
-              </a:ext>
-            </a:extLst>
-          </p:cNvPr>
-          <p:cNvSpPr txBox="1"/>
-          <p:nvPr/>
-        </p:nvSpPr>
-        <p:spPr>
-          <a:xfrm>
-            <a:off x="4444986" y="9456289"/>
-            <a:ext cx="3549612" cy="369332"/>
-          </a:xfrm>
-          <a:prstGeom prst="rect">
-            <a:avLst/>
-          </a:prstGeom>
-          <a:noFill/>
-        </p:spPr>
-        <p:txBody>
-          <a:bodyPr wrap="square" rtlCol="0">
-            <a:spAutoFit/>
-          </a:bodyPr>
-          <a:lstStyle/>
-          <a:p>
-            <a:r>
-              <a:rPr lang="en-US" dirty="0"/>
-              <a:t>Keep light  where it    is needed!</a:t>
-            </a:r>
-          </a:p>
-        </p:txBody>
-      </p:sp>
-      <p:sp>
-        <p:nvSpPr>
-          <p:cNvPr id="22" name="TextBox 21">
-            <a:extLst>
-              <a:ext uri="{FF2B5EF4-FFF2-40B4-BE49-F238E27FC236}">
-                <a16:creationId xmlns:a16="http://schemas.microsoft.com/office/drawing/2014/main" id="{AB350761-5B62-726C-5696-AE71F9CD72AB}"/>
-              </a:ext>
-            </a:extLst>
-          </p:cNvPr>
-          <p:cNvSpPr txBox="1"/>
-          <p:nvPr/>
-        </p:nvSpPr>
-        <p:spPr>
-          <a:xfrm>
-            <a:off x="4283489" y="5147195"/>
-            <a:ext cx="2971855" cy="646331"/>
-          </a:xfrm>
-          <a:prstGeom prst="rect">
-            <a:avLst/>
-          </a:prstGeom>
-          <a:noFill/>
-        </p:spPr>
-        <p:txBody>
-          <a:bodyPr wrap="square" rtlCol="0">
-            <a:spAutoFit/>
-          </a:bodyPr>
-          <a:lstStyle/>
-          <a:p>
-            <a:pPr algn="ctr"/>
-            <a:r>
-              <a:rPr lang="en-US" dirty="0">
-                <a:solidFill>
-                  <a:schemeClr val="bg1"/>
-                </a:solidFill>
-              </a:rPr>
-              <a:t>We are losing our skies but we can save them!</a:t>
-            </a:r>
-          </a:p>
-        </p:txBody>
-      </p:sp>
     </p:spTree>
     <p:extLst>
       <p:ext uri="{BB962C8B-B14F-4D97-AF65-F5344CB8AC3E}">

</xml_diff>

<commit_message>
fix typo on cover
</commit_message>
<xml_diff>
--- a/legislation/nspa cover.pptx
+++ b/legislation/nspa cover.pptx
@@ -3264,10 +3264,10 @@
       </p:sp>
       <p:pic>
         <p:nvPicPr>
-          <p:cNvPr id="3" name="Picture 2" descr="A screenshot of a cell phone&#10;&#10;AI-generated content may be incorrect.">
+          <p:cNvPr id="8" name="Picture 7" descr="A screenshot of a cell phone&#10;&#10;AI-generated content may be incorrect.">
             <a:extLst>
               <a:ext uri="{FF2B5EF4-FFF2-40B4-BE49-F238E27FC236}">
-                <a16:creationId xmlns:a16="http://schemas.microsoft.com/office/drawing/2014/main" id="{211BDEE8-00F9-ED77-0F84-6245B6EAE304}"/>
+                <a16:creationId xmlns:a16="http://schemas.microsoft.com/office/drawing/2014/main" id="{AB0F4CD5-17C9-6EE3-E228-7AE2E65153B7}"/>
               </a:ext>
             </a:extLst>
           </p:cNvPr>

</xml_diff>